<commit_message>
Changes in document, adding acknowledgement to dGb
</commit_message>
<xml_diff>
--- a/seismicWaveformClassificationImages.pptx
+++ b/seismicWaveformClassificationImages.pptx
@@ -110,6 +110,11 @@
       </a:defRPr>
     </a:lvl9pPr>
   </p:defaultTextStyle>
+  <p:extLst>
+    <p:ext uri="{EFAFB233-063F-42B5-8137-9DF3F51BA10A}">
+      <p15:sldGuideLst xmlns:p15="http://schemas.microsoft.com/office/powerpoint/2012/main"/>
+    </p:ext>
+  </p:extLst>
 </p:presentation>
 </file>
 
@@ -260,7 +265,7 @@
           <a:p>
             <a:fld id="{19FBAB41-E998-4748-B01A-48311CF0A565}" type="datetimeFigureOut">
               <a:rPr lang="en-US" smtClean="0"/>
-              <a:t>7/19/2025</a:t>
+              <a:t>7/22/25</a:t>
             </a:fld>
             <a:endParaRPr lang="en-US"/>
           </a:p>
@@ -458,7 +463,7 @@
           <a:p>
             <a:fld id="{19FBAB41-E998-4748-B01A-48311CF0A565}" type="datetimeFigureOut">
               <a:rPr lang="en-US" smtClean="0"/>
-              <a:t>7/19/2025</a:t>
+              <a:t>7/22/25</a:t>
             </a:fld>
             <a:endParaRPr lang="en-US"/>
           </a:p>
@@ -666,7 +671,7 @@
           <a:p>
             <a:fld id="{19FBAB41-E998-4748-B01A-48311CF0A565}" type="datetimeFigureOut">
               <a:rPr lang="en-US" smtClean="0"/>
-              <a:t>7/19/2025</a:t>
+              <a:t>7/22/25</a:t>
             </a:fld>
             <a:endParaRPr lang="en-US"/>
           </a:p>
@@ -864,7 +869,7 @@
           <a:p>
             <a:fld id="{19FBAB41-E998-4748-B01A-48311CF0A565}" type="datetimeFigureOut">
               <a:rPr lang="en-US" smtClean="0"/>
-              <a:t>7/19/2025</a:t>
+              <a:t>7/22/25</a:t>
             </a:fld>
             <a:endParaRPr lang="en-US"/>
           </a:p>
@@ -1139,7 +1144,7 @@
           <a:p>
             <a:fld id="{19FBAB41-E998-4748-B01A-48311CF0A565}" type="datetimeFigureOut">
               <a:rPr lang="en-US" smtClean="0"/>
-              <a:t>7/19/2025</a:t>
+              <a:t>7/22/25</a:t>
             </a:fld>
             <a:endParaRPr lang="en-US"/>
           </a:p>
@@ -1404,7 +1409,7 @@
           <a:p>
             <a:fld id="{19FBAB41-E998-4748-B01A-48311CF0A565}" type="datetimeFigureOut">
               <a:rPr lang="en-US" smtClean="0"/>
-              <a:t>7/19/2025</a:t>
+              <a:t>7/22/25</a:t>
             </a:fld>
             <a:endParaRPr lang="en-US"/>
           </a:p>
@@ -1816,7 +1821,7 @@
           <a:p>
             <a:fld id="{19FBAB41-E998-4748-B01A-48311CF0A565}" type="datetimeFigureOut">
               <a:rPr lang="en-US" smtClean="0"/>
-              <a:t>7/19/2025</a:t>
+              <a:t>7/22/25</a:t>
             </a:fld>
             <a:endParaRPr lang="en-US"/>
           </a:p>
@@ -1957,7 +1962,7 @@
           <a:p>
             <a:fld id="{19FBAB41-E998-4748-B01A-48311CF0A565}" type="datetimeFigureOut">
               <a:rPr lang="en-US" smtClean="0"/>
-              <a:t>7/19/2025</a:t>
+              <a:t>7/22/25</a:t>
             </a:fld>
             <a:endParaRPr lang="en-US"/>
           </a:p>
@@ -2070,7 +2075,7 @@
           <a:p>
             <a:fld id="{19FBAB41-E998-4748-B01A-48311CF0A565}" type="datetimeFigureOut">
               <a:rPr lang="en-US" smtClean="0"/>
-              <a:t>7/19/2025</a:t>
+              <a:t>7/22/25</a:t>
             </a:fld>
             <a:endParaRPr lang="en-US"/>
           </a:p>
@@ -2381,7 +2386,7 @@
           <a:p>
             <a:fld id="{19FBAB41-E998-4748-B01A-48311CF0A565}" type="datetimeFigureOut">
               <a:rPr lang="en-US" smtClean="0"/>
-              <a:t>7/19/2025</a:t>
+              <a:t>7/22/25</a:t>
             </a:fld>
             <a:endParaRPr lang="en-US"/>
           </a:p>
@@ -2669,7 +2674,7 @@
           <a:p>
             <a:fld id="{19FBAB41-E998-4748-B01A-48311CF0A565}" type="datetimeFigureOut">
               <a:rPr lang="en-US" smtClean="0"/>
-              <a:t>7/19/2025</a:t>
+              <a:t>7/22/25</a:t>
             </a:fld>
             <a:endParaRPr lang="en-US"/>
           </a:p>
@@ -2910,7 +2915,7 @@
           <a:p>
             <a:fld id="{19FBAB41-E998-4748-B01A-48311CF0A565}" type="datetimeFigureOut">
               <a:rPr lang="en-US" smtClean="0"/>
-              <a:t>7/19/2025</a:t>
+              <a:t>7/22/25</a:t>
             </a:fld>
             <a:endParaRPr lang="en-US"/>
           </a:p>
@@ -3327,6 +3332,60 @@
           <a:chExt cx="0" cy="0"/>
         </a:xfrm>
       </p:grpSpPr>
+      <p:sp>
+        <p:nvSpPr>
+          <p:cNvPr id="2" name="Rectangle 1">
+            <a:extLst>
+              <a:ext uri="{FF2B5EF4-FFF2-40B4-BE49-F238E27FC236}">
+                <a16:creationId xmlns:a16="http://schemas.microsoft.com/office/drawing/2014/main" id="{839B6F07-85BF-C59B-647F-1CC815C8218C}"/>
+              </a:ext>
+            </a:extLst>
+          </p:cNvPr>
+          <p:cNvSpPr/>
+          <p:nvPr/>
+        </p:nvSpPr>
+        <p:spPr>
+          <a:xfrm>
+            <a:off x="137160" y="1737360"/>
+            <a:ext cx="11948160" cy="3550920"/>
+          </a:xfrm>
+          <a:prstGeom prst="rect">
+            <a:avLst/>
+          </a:prstGeom>
+          <a:solidFill>
+            <a:schemeClr val="bg1"/>
+          </a:solidFill>
+          <a:ln>
+            <a:solidFill>
+              <a:schemeClr val="bg1"/>
+            </a:solidFill>
+          </a:ln>
+        </p:spPr>
+        <p:style>
+          <a:lnRef idx="2">
+            <a:schemeClr val="accent1">
+              <a:shade val="15000"/>
+            </a:schemeClr>
+          </a:lnRef>
+          <a:fillRef idx="1">
+            <a:schemeClr val="accent1"/>
+          </a:fillRef>
+          <a:effectRef idx="0">
+            <a:schemeClr val="accent1"/>
+          </a:effectRef>
+          <a:fontRef idx="minor">
+            <a:schemeClr val="lt1"/>
+          </a:fontRef>
+        </p:style>
+        <p:txBody>
+          <a:bodyPr rtlCol="0" anchor="ctr"/>
+          <a:lstStyle/>
+          <a:p>
+            <a:pPr algn="ctr"/>
+            <a:endParaRPr lang="en-US"/>
+          </a:p>
+        </p:txBody>
+      </p:sp>
       <p:pic>
         <p:nvPicPr>
           <p:cNvPr id="21" name="Picture 20">
@@ -3777,6 +3836,60 @@
           <a:chExt cx="0" cy="0"/>
         </a:xfrm>
       </p:grpSpPr>
+      <p:sp>
+        <p:nvSpPr>
+          <p:cNvPr id="2" name="Rectangle 1">
+            <a:extLst>
+              <a:ext uri="{FF2B5EF4-FFF2-40B4-BE49-F238E27FC236}">
+                <a16:creationId xmlns:a16="http://schemas.microsoft.com/office/drawing/2014/main" id="{47706300-B76A-4BA8-B33C-48CC25E571CB}"/>
+              </a:ext>
+            </a:extLst>
+          </p:cNvPr>
+          <p:cNvSpPr/>
+          <p:nvPr/>
+        </p:nvSpPr>
+        <p:spPr>
+          <a:xfrm>
+            <a:off x="0" y="922804"/>
+            <a:ext cx="12192000" cy="5935196"/>
+          </a:xfrm>
+          <a:prstGeom prst="rect">
+            <a:avLst/>
+          </a:prstGeom>
+          <a:solidFill>
+            <a:schemeClr val="bg1"/>
+          </a:solidFill>
+          <a:ln>
+            <a:solidFill>
+              <a:schemeClr val="bg1"/>
+            </a:solidFill>
+          </a:ln>
+        </p:spPr>
+        <p:style>
+          <a:lnRef idx="2">
+            <a:schemeClr val="accent1">
+              <a:shade val="15000"/>
+            </a:schemeClr>
+          </a:lnRef>
+          <a:fillRef idx="1">
+            <a:schemeClr val="accent1"/>
+          </a:fillRef>
+          <a:effectRef idx="0">
+            <a:schemeClr val="accent1"/>
+          </a:effectRef>
+          <a:fontRef idx="minor">
+            <a:schemeClr val="lt1"/>
+          </a:fontRef>
+        </p:style>
+        <p:txBody>
+          <a:bodyPr rtlCol="0" anchor="ctr"/>
+          <a:lstStyle/>
+          <a:p>
+            <a:pPr algn="ctr"/>
+            <a:endParaRPr lang="en-US"/>
+          </a:p>
+        </p:txBody>
+      </p:sp>
       <p:pic>
         <p:nvPicPr>
           <p:cNvPr id="23" name="Picture 22">
@@ -4343,6 +4456,60 @@
           <a:chExt cx="0" cy="0"/>
         </a:xfrm>
       </p:grpSpPr>
+      <p:sp>
+        <p:nvSpPr>
+          <p:cNvPr id="2" name="Rectangle 1">
+            <a:extLst>
+              <a:ext uri="{FF2B5EF4-FFF2-40B4-BE49-F238E27FC236}">
+                <a16:creationId xmlns:a16="http://schemas.microsoft.com/office/drawing/2014/main" id="{2B3D6B61-0DB8-95B5-74D7-F6DD6F687687}"/>
+              </a:ext>
+            </a:extLst>
+          </p:cNvPr>
+          <p:cNvSpPr/>
+          <p:nvPr/>
+        </p:nvSpPr>
+        <p:spPr>
+          <a:xfrm>
+            <a:off x="1545708" y="0"/>
+            <a:ext cx="9100583" cy="6858000"/>
+          </a:xfrm>
+          <a:prstGeom prst="rect">
+            <a:avLst/>
+          </a:prstGeom>
+          <a:solidFill>
+            <a:schemeClr val="bg1"/>
+          </a:solidFill>
+          <a:ln>
+            <a:solidFill>
+              <a:schemeClr val="bg1"/>
+            </a:solidFill>
+          </a:ln>
+        </p:spPr>
+        <p:style>
+          <a:lnRef idx="2">
+            <a:schemeClr val="accent1">
+              <a:shade val="15000"/>
+            </a:schemeClr>
+          </a:lnRef>
+          <a:fillRef idx="1">
+            <a:schemeClr val="accent1"/>
+          </a:fillRef>
+          <a:effectRef idx="0">
+            <a:schemeClr val="accent1"/>
+          </a:effectRef>
+          <a:fontRef idx="minor">
+            <a:schemeClr val="lt1"/>
+          </a:fontRef>
+        </p:style>
+        <p:txBody>
+          <a:bodyPr rtlCol="0" anchor="ctr"/>
+          <a:lstStyle/>
+          <a:p>
+            <a:pPr algn="ctr"/>
+            <a:endParaRPr lang="en-US"/>
+          </a:p>
+        </p:txBody>
+      </p:sp>
       <p:pic>
         <p:nvPicPr>
           <p:cNvPr id="3" name="Picture 2">
@@ -4629,6 +4796,60 @@
           <a:chExt cx="0" cy="0"/>
         </a:xfrm>
       </p:grpSpPr>
+      <p:sp>
+        <p:nvSpPr>
+          <p:cNvPr id="2" name="Rectangle 1">
+            <a:extLst>
+              <a:ext uri="{FF2B5EF4-FFF2-40B4-BE49-F238E27FC236}">
+                <a16:creationId xmlns:a16="http://schemas.microsoft.com/office/drawing/2014/main" id="{9C1469AC-8C2A-C8B7-25F2-856BCBAA4810}"/>
+              </a:ext>
+            </a:extLst>
+          </p:cNvPr>
+          <p:cNvSpPr/>
+          <p:nvPr/>
+        </p:nvSpPr>
+        <p:spPr>
+          <a:xfrm>
+            <a:off x="487680" y="401940"/>
+            <a:ext cx="11098642" cy="6273195"/>
+          </a:xfrm>
+          <a:prstGeom prst="rect">
+            <a:avLst/>
+          </a:prstGeom>
+          <a:solidFill>
+            <a:schemeClr val="bg1"/>
+          </a:solidFill>
+          <a:ln>
+            <a:solidFill>
+              <a:schemeClr val="bg1"/>
+            </a:solidFill>
+          </a:ln>
+        </p:spPr>
+        <p:style>
+          <a:lnRef idx="2">
+            <a:schemeClr val="accent1">
+              <a:shade val="15000"/>
+            </a:schemeClr>
+          </a:lnRef>
+          <a:fillRef idx="1">
+            <a:schemeClr val="accent1"/>
+          </a:fillRef>
+          <a:effectRef idx="0">
+            <a:schemeClr val="accent1"/>
+          </a:effectRef>
+          <a:fontRef idx="minor">
+            <a:schemeClr val="lt1"/>
+          </a:fontRef>
+        </p:style>
+        <p:txBody>
+          <a:bodyPr rtlCol="0" anchor="ctr"/>
+          <a:lstStyle/>
+          <a:p>
+            <a:pPr algn="ctr"/>
+            <a:endParaRPr lang="en-US"/>
+          </a:p>
+        </p:txBody>
+      </p:sp>
       <p:pic>
         <p:nvPicPr>
           <p:cNvPr id="3" name="Picture 2">
@@ -5305,6 +5526,60 @@
           <a:chExt cx="0" cy="0"/>
         </a:xfrm>
       </p:grpSpPr>
+      <p:sp>
+        <p:nvSpPr>
+          <p:cNvPr id="2" name="Rectangle 1">
+            <a:extLst>
+              <a:ext uri="{FF2B5EF4-FFF2-40B4-BE49-F238E27FC236}">
+                <a16:creationId xmlns:a16="http://schemas.microsoft.com/office/drawing/2014/main" id="{90376C3F-0556-C321-68BA-955D02055579}"/>
+              </a:ext>
+            </a:extLst>
+          </p:cNvPr>
+          <p:cNvSpPr/>
+          <p:nvPr/>
+        </p:nvSpPr>
+        <p:spPr>
+          <a:xfrm>
+            <a:off x="137160" y="1471612"/>
+            <a:ext cx="11716702" cy="3816668"/>
+          </a:xfrm>
+          <a:prstGeom prst="rect">
+            <a:avLst/>
+          </a:prstGeom>
+          <a:solidFill>
+            <a:schemeClr val="bg1"/>
+          </a:solidFill>
+          <a:ln>
+            <a:solidFill>
+              <a:schemeClr val="bg1"/>
+            </a:solidFill>
+          </a:ln>
+        </p:spPr>
+        <p:style>
+          <a:lnRef idx="2">
+            <a:schemeClr val="accent1">
+              <a:shade val="15000"/>
+            </a:schemeClr>
+          </a:lnRef>
+          <a:fillRef idx="1">
+            <a:schemeClr val="accent1"/>
+          </a:fillRef>
+          <a:effectRef idx="0">
+            <a:schemeClr val="accent1"/>
+          </a:effectRef>
+          <a:fontRef idx="minor">
+            <a:schemeClr val="lt1"/>
+          </a:fontRef>
+        </p:style>
+        <p:txBody>
+          <a:bodyPr rtlCol="0" anchor="ctr"/>
+          <a:lstStyle/>
+          <a:p>
+            <a:pPr algn="ctr"/>
+            <a:endParaRPr lang="en-US"/>
+          </a:p>
+        </p:txBody>
+      </p:sp>
       <p:pic>
         <p:nvPicPr>
           <p:cNvPr id="3" name="Picture 2">
@@ -5371,6 +5646,60 @@
           <a:chExt cx="0" cy="0"/>
         </a:xfrm>
       </p:grpSpPr>
+      <p:sp>
+        <p:nvSpPr>
+          <p:cNvPr id="2" name="Rectangle 1">
+            <a:extLst>
+              <a:ext uri="{FF2B5EF4-FFF2-40B4-BE49-F238E27FC236}">
+                <a16:creationId xmlns:a16="http://schemas.microsoft.com/office/drawing/2014/main" id="{E61292D8-6D39-EC98-BFD8-66E2B9A14319}"/>
+              </a:ext>
+            </a:extLst>
+          </p:cNvPr>
+          <p:cNvSpPr/>
+          <p:nvPr/>
+        </p:nvSpPr>
+        <p:spPr>
+          <a:xfrm>
+            <a:off x="137160" y="1917508"/>
+            <a:ext cx="11948160" cy="2656945"/>
+          </a:xfrm>
+          <a:prstGeom prst="rect">
+            <a:avLst/>
+          </a:prstGeom>
+          <a:solidFill>
+            <a:schemeClr val="bg1"/>
+          </a:solidFill>
+          <a:ln>
+            <a:solidFill>
+              <a:schemeClr val="bg1"/>
+            </a:solidFill>
+          </a:ln>
+        </p:spPr>
+        <p:style>
+          <a:lnRef idx="2">
+            <a:schemeClr val="accent1">
+              <a:shade val="15000"/>
+            </a:schemeClr>
+          </a:lnRef>
+          <a:fillRef idx="1">
+            <a:schemeClr val="accent1"/>
+          </a:fillRef>
+          <a:effectRef idx="0">
+            <a:schemeClr val="accent1"/>
+          </a:effectRef>
+          <a:fontRef idx="minor">
+            <a:schemeClr val="lt1"/>
+          </a:fontRef>
+        </p:style>
+        <p:txBody>
+          <a:bodyPr rtlCol="0" anchor="ctr"/>
+          <a:lstStyle/>
+          <a:p>
+            <a:pPr algn="ctr"/>
+            <a:endParaRPr lang="en-US"/>
+          </a:p>
+        </p:txBody>
+      </p:sp>
       <p:grpSp>
         <p:nvGrpSpPr>
           <p:cNvPr id="7" name="Group 6">
@@ -5708,6 +6037,60 @@
           <a:chExt cx="0" cy="0"/>
         </a:xfrm>
       </p:grpSpPr>
+      <p:sp>
+        <p:nvSpPr>
+          <p:cNvPr id="2" name="Rectangle 1">
+            <a:extLst>
+              <a:ext uri="{FF2B5EF4-FFF2-40B4-BE49-F238E27FC236}">
+                <a16:creationId xmlns:a16="http://schemas.microsoft.com/office/drawing/2014/main" id="{CFFCEC96-5230-07CC-9443-D9AA3AE16ACE}"/>
+              </a:ext>
+            </a:extLst>
+          </p:cNvPr>
+          <p:cNvSpPr/>
+          <p:nvPr/>
+        </p:nvSpPr>
+        <p:spPr>
+          <a:xfrm>
+            <a:off x="2938462" y="666261"/>
+            <a:ext cx="5628264" cy="5115413"/>
+          </a:xfrm>
+          <a:prstGeom prst="rect">
+            <a:avLst/>
+          </a:prstGeom>
+          <a:solidFill>
+            <a:schemeClr val="bg1"/>
+          </a:solidFill>
+          <a:ln>
+            <a:solidFill>
+              <a:schemeClr val="bg1"/>
+            </a:solidFill>
+          </a:ln>
+        </p:spPr>
+        <p:style>
+          <a:lnRef idx="2">
+            <a:schemeClr val="accent1">
+              <a:shade val="15000"/>
+            </a:schemeClr>
+          </a:lnRef>
+          <a:fillRef idx="1">
+            <a:schemeClr val="accent1"/>
+          </a:fillRef>
+          <a:effectRef idx="0">
+            <a:schemeClr val="accent1"/>
+          </a:effectRef>
+          <a:fontRef idx="minor">
+            <a:schemeClr val="lt1"/>
+          </a:fontRef>
+        </p:style>
+        <p:txBody>
+          <a:bodyPr rtlCol="0" anchor="ctr"/>
+          <a:lstStyle/>
+          <a:p>
+            <a:pPr algn="ctr"/>
+            <a:endParaRPr lang="en-US"/>
+          </a:p>
+        </p:txBody>
+      </p:sp>
       <p:pic>
         <p:nvPicPr>
           <p:cNvPr id="5" name="Picture 4">
@@ -5790,7 +6173,7 @@
           </a:prstGeom>
           <a:ln>
             <a:solidFill>
-              <a:srgbClr val="00FF00"/>
+              <a:schemeClr val="tx1"/>
             </a:solidFill>
             <a:prstDash val="lgDash"/>
           </a:ln>
@@ -5834,7 +6217,7 @@
           </a:prstGeom>
           <a:ln>
             <a:solidFill>
-              <a:srgbClr val="00FF00"/>
+              <a:schemeClr val="tx1"/>
             </a:solidFill>
             <a:prstDash val="lgDash"/>
           </a:ln>
@@ -6074,6 +6457,154 @@
           </p:txBody>
         </p:sp>
       </p:grpSp>
+      <p:sp>
+        <p:nvSpPr>
+          <p:cNvPr id="3" name="TextBox 2">
+            <a:extLst>
+              <a:ext uri="{FF2B5EF4-FFF2-40B4-BE49-F238E27FC236}">
+                <a16:creationId xmlns:a16="http://schemas.microsoft.com/office/drawing/2014/main" id="{4BE39C4E-28B7-DC3C-F0F5-AA5AEE4380AF}"/>
+              </a:ext>
+            </a:extLst>
+          </p:cNvPr>
+          <p:cNvSpPr txBox="1"/>
+          <p:nvPr/>
+        </p:nvSpPr>
+        <p:spPr>
+          <a:xfrm>
+            <a:off x="3531171" y="1946070"/>
+            <a:ext cx="320922" cy="369332"/>
+          </a:xfrm>
+          <a:prstGeom prst="rect">
+            <a:avLst/>
+          </a:prstGeom>
+          <a:noFill/>
+        </p:spPr>
+        <p:txBody>
+          <a:bodyPr wrap="none" rtlCol="0">
+            <a:spAutoFit/>
+          </a:bodyPr>
+          <a:lstStyle/>
+          <a:p>
+            <a:r>
+              <a:rPr lang="en-US" dirty="0">
+                <a:solidFill>
+                  <a:srgbClr val="00FF00"/>
+                </a:solidFill>
+              </a:rPr>
+              <a:t>A</a:t>
+            </a:r>
+          </a:p>
+        </p:txBody>
+      </p:sp>
+      <p:sp>
+        <p:nvSpPr>
+          <p:cNvPr id="4" name="TextBox 3">
+            <a:extLst>
+              <a:ext uri="{FF2B5EF4-FFF2-40B4-BE49-F238E27FC236}">
+                <a16:creationId xmlns:a16="http://schemas.microsoft.com/office/drawing/2014/main" id="{C7DD70F6-9A9C-971F-D48C-95FF1ED4AF06}"/>
+              </a:ext>
+            </a:extLst>
+          </p:cNvPr>
+          <p:cNvSpPr txBox="1"/>
+          <p:nvPr/>
+        </p:nvSpPr>
+        <p:spPr>
+          <a:xfrm>
+            <a:off x="3308169" y="4149210"/>
+            <a:ext cx="320922" cy="369332"/>
+          </a:xfrm>
+          <a:prstGeom prst="rect">
+            <a:avLst/>
+          </a:prstGeom>
+          <a:noFill/>
+        </p:spPr>
+        <p:txBody>
+          <a:bodyPr wrap="none" rtlCol="0">
+            <a:spAutoFit/>
+          </a:bodyPr>
+          <a:lstStyle/>
+          <a:p>
+            <a:r>
+              <a:rPr lang="en-US" dirty="0"/>
+              <a:t>A</a:t>
+            </a:r>
+          </a:p>
+        </p:txBody>
+      </p:sp>
+      <p:sp>
+        <p:nvSpPr>
+          <p:cNvPr id="7" name="TextBox 6">
+            <a:extLst>
+              <a:ext uri="{FF2B5EF4-FFF2-40B4-BE49-F238E27FC236}">
+                <a16:creationId xmlns:a16="http://schemas.microsoft.com/office/drawing/2014/main" id="{6AA7344A-8EFE-B982-AD20-9BB7F0388A39}"/>
+              </a:ext>
+            </a:extLst>
+          </p:cNvPr>
+          <p:cNvSpPr txBox="1"/>
+          <p:nvPr/>
+        </p:nvSpPr>
+        <p:spPr>
+          <a:xfrm>
+            <a:off x="7401691" y="1946070"/>
+            <a:ext cx="369012" cy="369332"/>
+          </a:xfrm>
+          <a:prstGeom prst="rect">
+            <a:avLst/>
+          </a:prstGeom>
+          <a:noFill/>
+        </p:spPr>
+        <p:txBody>
+          <a:bodyPr wrap="none" rtlCol="0">
+            <a:spAutoFit/>
+          </a:bodyPr>
+          <a:lstStyle/>
+          <a:p>
+            <a:r>
+              <a:rPr lang="en-US" dirty="0">
+                <a:solidFill>
+                  <a:srgbClr val="00FF00"/>
+                </a:solidFill>
+              </a:rPr>
+              <a:t>A’</a:t>
+            </a:r>
+          </a:p>
+        </p:txBody>
+      </p:sp>
+      <p:sp>
+        <p:nvSpPr>
+          <p:cNvPr id="10" name="TextBox 9">
+            <a:extLst>
+              <a:ext uri="{FF2B5EF4-FFF2-40B4-BE49-F238E27FC236}">
+                <a16:creationId xmlns:a16="http://schemas.microsoft.com/office/drawing/2014/main" id="{5ACEF4F5-8A13-0F9F-69E5-2A0D7A38CB85}"/>
+              </a:ext>
+            </a:extLst>
+          </p:cNvPr>
+          <p:cNvSpPr txBox="1"/>
+          <p:nvPr/>
+        </p:nvSpPr>
+        <p:spPr>
+          <a:xfrm>
+            <a:off x="7496544" y="4149210"/>
+            <a:ext cx="369012" cy="369332"/>
+          </a:xfrm>
+          <a:prstGeom prst="rect">
+            <a:avLst/>
+          </a:prstGeom>
+          <a:noFill/>
+        </p:spPr>
+        <p:txBody>
+          <a:bodyPr wrap="none" rtlCol="0">
+            <a:spAutoFit/>
+          </a:bodyPr>
+          <a:lstStyle/>
+          <a:p>
+            <a:r>
+              <a:rPr lang="en-US" dirty="0"/>
+              <a:t>A’</a:t>
+            </a:r>
+          </a:p>
+        </p:txBody>
+      </p:sp>
     </p:spTree>
     <p:extLst>
       <p:ext uri="{BB962C8B-B14F-4D97-AF65-F5344CB8AC3E}">

</xml_diff>